<commit_message>
updates the key space for Polyalphabetic cipher
</commit_message>
<xml_diff>
--- a/cits1003-lecture_slides/CITS1003-2 Cryptography-exercises.pptx
+++ b/cits1003-lecture_slides/CITS1003-2 Cryptography-exercises.pptx
@@ -178,7 +178,7 @@
   <pc:docChgLst>
     <pc:chgData name="张 智" userId="36bdf691fd3510be" providerId="LiveId" clId="{E2839AA1-C984-4C9D-828C-A295C6111CDB}"/>
     <pc:docChg chg="undo custSel addSld delSld modSld sldOrd">
-      <pc:chgData name="张 智" userId="36bdf691fd3510be" providerId="LiveId" clId="{E2839AA1-C984-4C9D-828C-A295C6111CDB}" dt="2023-03-06T13:41:52.091" v="9119" actId="20577"/>
+      <pc:chgData name="张 智" userId="36bdf691fd3510be" providerId="LiveId" clId="{E2839AA1-C984-4C9D-828C-A295C6111CDB}" dt="2023-03-07T14:38:32.192" v="9547" actId="20577"/>
       <pc:docMkLst>
         <pc:docMk/>
       </pc:docMkLst>
@@ -316,13 +316,29 @@
         </pc:spChg>
       </pc:sldChg>
       <pc:sldChg chg="modSp mod modNotesTx">
-        <pc:chgData name="张 智" userId="36bdf691fd3510be" providerId="LiveId" clId="{E2839AA1-C984-4C9D-828C-A295C6111CDB}" dt="2023-03-06T05:20:45.154" v="4787" actId="20577"/>
+        <pc:chgData name="张 智" userId="36bdf691fd3510be" providerId="LiveId" clId="{E2839AA1-C984-4C9D-828C-A295C6111CDB}" dt="2023-03-07T14:38:32.192" v="9547" actId="20577"/>
         <pc:sldMkLst>
           <pc:docMk/>
           <pc:sldMk cId="1696639929" sldId="328"/>
         </pc:sldMkLst>
         <pc:spChg chg="mod">
-          <ac:chgData name="张 智" userId="36bdf691fd3510be" providerId="LiveId" clId="{E2839AA1-C984-4C9D-828C-A295C6111CDB}" dt="2023-03-06T05:19:42.997" v="4601" actId="20577"/>
+          <ac:chgData name="张 智" userId="36bdf691fd3510be" providerId="LiveId" clId="{E2839AA1-C984-4C9D-828C-A295C6111CDB}" dt="2023-03-07T14:36:03.320" v="9320" actId="20577"/>
+          <ac:spMkLst>
+            <pc:docMk/>
+            <pc:sldMk cId="1696639929" sldId="328"/>
+            <ac:spMk id="6" creationId="{F18A62D7-92A3-47F0-BB76-D8FAA161F00D}"/>
+          </ac:spMkLst>
+        </pc:spChg>
+        <pc:spChg chg="mod">
+          <ac:chgData name="张 智" userId="36bdf691fd3510be" providerId="LiveId" clId="{E2839AA1-C984-4C9D-828C-A295C6111CDB}" dt="2023-03-07T14:37:35.369" v="9492" actId="20577"/>
+          <ac:spMkLst>
+            <pc:docMk/>
+            <pc:sldMk cId="1696639929" sldId="328"/>
+            <ac:spMk id="7" creationId="{AAEDE18B-16ED-4051-8375-05743210B841}"/>
+          </ac:spMkLst>
+        </pc:spChg>
+        <pc:spChg chg="mod">
+          <ac:chgData name="张 智" userId="36bdf691fd3510be" providerId="LiveId" clId="{E2839AA1-C984-4C9D-828C-A295C6111CDB}" dt="2023-03-07T14:15:55.716" v="9254" actId="20577"/>
           <ac:spMkLst>
             <pc:docMk/>
             <pc:sldMk cId="1696639929" sldId="328"/>
@@ -564,12 +580,20 @@
           <pc:sldMk cId="3657024321" sldId="350"/>
         </pc:sldMkLst>
       </pc:sldChg>
-      <pc:sldChg chg="add modNotesTx">
-        <pc:chgData name="张 智" userId="36bdf691fd3510be" providerId="LiveId" clId="{E2839AA1-C984-4C9D-828C-A295C6111CDB}" dt="2023-03-06T05:29:15.934" v="4978" actId="20577"/>
+      <pc:sldChg chg="modSp add mod modNotesTx">
+        <pc:chgData name="张 智" userId="36bdf691fd3510be" providerId="LiveId" clId="{E2839AA1-C984-4C9D-828C-A295C6111CDB}" dt="2023-03-07T14:11:17.636" v="9128" actId="20577"/>
         <pc:sldMkLst>
           <pc:docMk/>
           <pc:sldMk cId="3943154742" sldId="351"/>
         </pc:sldMkLst>
+        <pc:spChg chg="mod">
+          <ac:chgData name="张 智" userId="36bdf691fd3510be" providerId="LiveId" clId="{E2839AA1-C984-4C9D-828C-A295C6111CDB}" dt="2023-03-07T14:11:17.636" v="9128" actId="20577"/>
+          <ac:spMkLst>
+            <pc:docMk/>
+            <pc:sldMk cId="3943154742" sldId="351"/>
+            <ac:spMk id="3" creationId="{A39D72D1-256A-4B1B-9CB0-BCD3A203872C}"/>
+          </ac:spMkLst>
+        </pc:spChg>
       </pc:sldChg>
       <pc:sldChg chg="add modNotesTx">
         <pc:chgData name="张 智" userId="36bdf691fd3510be" providerId="LiveId" clId="{E2839AA1-C984-4C9D-828C-A295C6111CDB}" dt="2023-03-06T05:30:41.384" v="5083" actId="20577"/>
@@ -12705,7 +12729,7 @@
           </a:effectLst>
           <a:extLst>
             <a:ext uri="{91240B29-F687-4f45-9708-019B960494DF}">
-              <a14:hiddenLine xmlns="" xmlns:a14="http://schemas.microsoft.com/office/drawing/2010/main" xmlns:p14="http://schemas.microsoft.com/office/powerpoint/2010/main" xmlns:a16="http://schemas.microsoft.com/office/drawing/2014/main" w="9525">
+              <a14:hiddenLine xmlns:a16="http://schemas.microsoft.com/office/drawing/2014/main" xmlns:p14="http://schemas.microsoft.com/office/powerpoint/2010/main" xmlns:a14="http://schemas.microsoft.com/office/drawing/2010/main" xmlns="" w="9525">
                 <a:solidFill>
                   <a:srgbClr val="000000"/>
                 </a:solidFill>
@@ -15422,8 +15446,13 @@
             </a:r>
             <a:r>
               <a:rPr lang="en-AU" dirty="0"/>
-              <a:t>): 26!</a:t>
-            </a:r>
+              <a:t>): 26</a:t>
+            </a:r>
+            <a:r>
+              <a:rPr lang="en-US" dirty="0"/>
+              <a:t>^n</a:t>
+            </a:r>
+            <a:endParaRPr lang="en-AU" dirty="0"/>
           </a:p>
         </p:txBody>
       </p:sp>
@@ -15921,19 +15950,7 @@
             </a:pPr>
             <a:r>
               <a:rPr lang="en-AU" dirty="0"/>
-              <a:t>plaintext: ABC…XYZ (&gt;=26 letters)</a:t>
-            </a:r>
-          </a:p>
-          <a:p>
-            <a:pPr marL="36900" indent="0">
-              <a:buClr>
-                <a:srgbClr val="A629E7"/>
-              </a:buClr>
-              <a:buNone/>
-            </a:pPr>
-            <a:r>
-              <a:rPr lang="en-AU" dirty="0"/>
-              <a:t>key size: 26 letters in total</a:t>
+              <a:t>key size: n letters in total</a:t>
             </a:r>
           </a:p>
         </p:txBody>
@@ -16328,7 +16345,7 @@
             </a:pPr>
             <a:r>
               <a:rPr lang="en-AU" dirty="0"/>
-              <a:t>For plaintext “A”, there are 26 options for rotation.</a:t>
+              <a:t>For first letter, there are 26 options.</a:t>
             </a:r>
           </a:p>
           <a:p>
@@ -16340,7 +16357,7 @@
             </a:pPr>
             <a:r>
               <a:rPr lang="en-AU" dirty="0"/>
-              <a:t>For plaintext “B”, there are 25 options for rotation.</a:t>
+              <a:t>For second letter, there are 26 options.</a:t>
             </a:r>
           </a:p>
           <a:p>
@@ -16352,7 +16369,7 @@
             </a:pPr>
             <a:r>
               <a:rPr lang="en-AU" dirty="0"/>
-              <a:t>For plaintext “C”, there are 24 options for rotation.  </a:t>
+              <a:t>…</a:t>
             </a:r>
           </a:p>
           <a:p>
@@ -16364,7 +16381,7 @@
             </a:pPr>
             <a:r>
               <a:rPr lang="en-AU" dirty="0"/>
-              <a:t>…</a:t>
+              <a:t>For last letter, there are 26 options.  </a:t>
             </a:r>
           </a:p>
           <a:p>
@@ -16374,10 +16391,7 @@
               </a:buClr>
               <a:buNone/>
             </a:pPr>
-            <a:r>
-              <a:rPr lang="en-AU" dirty="0"/>
-              <a:t>For plaintext “X”, there are 3 options for rotation.  </a:t>
-            </a:r>
+            <a:endParaRPr lang="en-AU" dirty="0"/>
           </a:p>
           <a:p>
             <a:pPr marL="36900" indent="0">
@@ -16386,10 +16400,7 @@
               </a:buClr>
               <a:buNone/>
             </a:pPr>
-            <a:r>
-              <a:rPr lang="en-AU" dirty="0"/>
-              <a:t>For plaintext “Y”, there are 2 options for rotation.  </a:t>
-            </a:r>
+            <a:endParaRPr lang="en-AU" dirty="0"/>
           </a:p>
           <a:p>
             <a:pPr marL="36900" indent="0">
@@ -16398,10 +16409,7 @@
               </a:buClr>
               <a:buNone/>
             </a:pPr>
-            <a:r>
-              <a:rPr lang="en-AU" dirty="0"/>
-              <a:t>For plaintext “Z”, there is 1 option for rotation.  </a:t>
-            </a:r>
+            <a:endParaRPr lang="en-AU" dirty="0"/>
           </a:p>
         </p:txBody>
       </p:sp>
@@ -16421,7 +16429,7 @@
         </p:nvSpPr>
         <p:spPr>
           <a:xfrm>
-            <a:off x="5583895" y="4834303"/>
+            <a:off x="5573248" y="3930039"/>
             <a:ext cx="5694309" cy="1080722"/>
           </a:xfrm>
           <a:prstGeom prst="rect">
@@ -16795,7 +16803,7 @@
             </a:pPr>
             <a:r>
               <a:rPr lang="en-AU" dirty="0"/>
-              <a:t>key space: 26! = 26 * 25 * 24 * ... * 3 * 2 * 1</a:t>
+              <a:t>key space: 26^n</a:t>
             </a:r>
           </a:p>
         </p:txBody>

</xml_diff>